<commit_message>
added role to "user" table, introduced jwt and completed the basic function of add problem
</commit_message>
<xml_diff>
--- a/db.pptx
+++ b/db.pptx
@@ -3031,6 +3031,14 @@
             <a:pPr algn="ctr"/>
             <a:r>
               <a:rPr lang="en-US" altLang="zh-CN" dirty="0" err="1"/>
+              <a:t>role</a:t>
+            </a:r>
+            <a:endParaRPr lang="en-US" altLang="zh-CN" dirty="0" err="1"/>
+          </a:p>
+          <a:p>
+            <a:pPr algn="ctr"/>
+            <a:r>
+              <a:rPr lang="en-US" altLang="zh-CN" dirty="0" err="1"/>
               <a:t>date_registered</a:t>
             </a:r>
             <a:endParaRPr lang="en-US" altLang="zh-CN" dirty="0"/>

</xml_diff>

<commit_message>
added pages for problem details and codeblocks, changed some of the database schema, plus basic completion of adding problem feature (remains to be refined)
</commit_message>
<xml_diff>
--- a/db.pptx
+++ b/db.pptx
@@ -8,7 +8,6 @@
     <p:sldId id="282" r:id="rId3"/>
     <p:sldId id="283" r:id="rId4"/>
     <p:sldId id="284" r:id="rId5"/>
-    <p:sldId id="285" r:id="rId6"/>
   </p:sldIdLst>
   <p:sldSz cx="12192000" cy="6858000"/>
   <p:notesSz cx="6858000" cy="9144000"/>
@@ -3409,26 +3408,6 @@
           </a:p>
           <a:p>
             <a:pPr algn="ctr"/>
-            <a:r>
-              <a:rPr lang="en-US" altLang="zh-CN" dirty="0"/>
-              <a:t>company_id</a:t>
-            </a:r>
-            <a:endParaRPr lang="en-US" altLang="zh-CN" dirty="0"/>
-          </a:p>
-          <a:p>
-            <a:pPr algn="ctr"/>
-            <a:r>
-              <a:rPr lang="en-US" altLang="zh-CN" dirty="0"/>
-              <a:t>department_id</a:t>
-            </a:r>
-            <a:endParaRPr lang="en-US" altLang="zh-CN" dirty="0"/>
-          </a:p>
-          <a:p>
-            <a:pPr algn="ctr"/>
-            <a:r>
-              <a:rPr lang="en-US" altLang="zh-CN" dirty="0"/>
-              <a:t>post_id</a:t>
-            </a:r>
             <a:endParaRPr lang="en-US" altLang="zh-CN" dirty="0"/>
           </a:p>
         </p:txBody>
@@ -5047,130 +5026,6 @@
           </a:p>
         </p:txBody>
       </p:sp>
-      <p:sp>
-        <p:nvSpPr>
-          <p:cNvPr id="74" name="流程图: 决策 5"/>
-          <p:cNvSpPr/>
-          <p:nvPr/>
-        </p:nvSpPr>
-        <p:spPr>
-          <a:xfrm>
-            <a:off x="2167395" y="3305750"/>
-            <a:ext cx="1943954" cy="721643"/>
-          </a:xfrm>
-          <a:prstGeom prst="flowChartDecision">
-            <a:avLst/>
-          </a:prstGeom>
-          <a:solidFill>
-            <a:schemeClr val="accent6">
-              <a:lumMod val="40000"/>
-              <a:lumOff val="60000"/>
-              <a:alpha val="50000"/>
-            </a:schemeClr>
-          </a:solidFill>
-          <a:ln>
-            <a:solidFill>
-              <a:schemeClr val="tx1"/>
-            </a:solidFill>
-          </a:ln>
-        </p:spPr>
-        <p:style>
-          <a:lnRef idx="0">
-            <a:scrgbClr r="0" g="0" b="0"/>
-          </a:lnRef>
-          <a:fillRef idx="0">
-            <a:scrgbClr r="0" g="0" b="0"/>
-          </a:fillRef>
-          <a:effectRef idx="0">
-            <a:scrgbClr r="0" g="0" b="0"/>
-          </a:effectRef>
-          <a:fontRef idx="minor">
-            <a:schemeClr val="lt1"/>
-          </a:fontRef>
-        </p:style>
-        <p:txBody>
-          <a:bodyPr rtlCol="0" anchor="ctr"/>
-          <a:lstStyle/>
-          <a:p>
-            <a:pPr algn="ctr"/>
-            <a:r>
-              <a:rPr lang="en-US" altLang="zh-CN" sz="1000" dirty="0" err="1">
-                <a:solidFill>
-                  <a:schemeClr val="tx1"/>
-                </a:solidFill>
-              </a:rPr>
-              <a:t>user_dept</a:t>
-            </a:r>
-            <a:endParaRPr lang="zh-CN" altLang="en-US" sz="1000" dirty="0">
-              <a:solidFill>
-                <a:schemeClr val="tx1"/>
-              </a:solidFill>
-            </a:endParaRPr>
-          </a:p>
-        </p:txBody>
-      </p:sp>
-      <p:sp>
-        <p:nvSpPr>
-          <p:cNvPr id="75" name="流程图: 决策 5"/>
-          <p:cNvSpPr/>
-          <p:nvPr/>
-        </p:nvSpPr>
-        <p:spPr>
-          <a:xfrm>
-            <a:off x="2122135" y="5888317"/>
-            <a:ext cx="1943954" cy="721643"/>
-          </a:xfrm>
-          <a:prstGeom prst="flowChartDecision">
-            <a:avLst/>
-          </a:prstGeom>
-          <a:solidFill>
-            <a:schemeClr val="accent6">
-              <a:lumMod val="40000"/>
-              <a:lumOff val="60000"/>
-              <a:alpha val="50000"/>
-            </a:schemeClr>
-          </a:solidFill>
-          <a:ln>
-            <a:solidFill>
-              <a:schemeClr val="tx1"/>
-            </a:solidFill>
-          </a:ln>
-        </p:spPr>
-        <p:style>
-          <a:lnRef idx="0">
-            <a:scrgbClr r="0" g="0" b="0"/>
-          </a:lnRef>
-          <a:fillRef idx="0">
-            <a:scrgbClr r="0" g="0" b="0"/>
-          </a:fillRef>
-          <a:effectRef idx="0">
-            <a:scrgbClr r="0" g="0" b="0"/>
-          </a:effectRef>
-          <a:fontRef idx="minor">
-            <a:schemeClr val="lt1"/>
-          </a:fontRef>
-        </p:style>
-        <p:txBody>
-          <a:bodyPr rtlCol="0" anchor="ctr"/>
-          <a:lstStyle/>
-          <a:p>
-            <a:pPr algn="ctr"/>
-            <a:r>
-              <a:rPr lang="en-US" altLang="zh-CN" sz="1000" dirty="0" err="1">
-                <a:solidFill>
-                  <a:schemeClr val="tx1"/>
-                </a:solidFill>
-              </a:rPr>
-              <a:t>user_post</a:t>
-            </a:r>
-            <a:endParaRPr lang="zh-CN" altLang="en-US" sz="1000" dirty="0">
-              <a:solidFill>
-                <a:schemeClr val="tx1"/>
-              </a:solidFill>
-            </a:endParaRPr>
-          </a:p>
-        </p:txBody>
-      </p:sp>
       <p:cxnSp>
         <p:nvCxnSpPr>
           <p:cNvPr id="79" name="Straight Connector 78"/>
@@ -5203,16 +5058,46 @@
           </a:fontRef>
         </p:style>
       </p:cxnSp>
+      <p:sp>
+        <p:nvSpPr>
+          <p:cNvPr id="84" name="文本框 107"/>
+          <p:cNvSpPr txBox="1"/>
+          <p:nvPr/>
+        </p:nvSpPr>
+        <p:spPr>
+          <a:xfrm>
+            <a:off x="4381947" y="499472"/>
+            <a:ext cx="501983" cy="260350"/>
+          </a:xfrm>
+          <a:prstGeom prst="rect">
+            <a:avLst/>
+          </a:prstGeom>
+          <a:noFill/>
+        </p:spPr>
+        <p:txBody>
+          <a:bodyPr wrap="square" rtlCol="0">
+            <a:spAutoFit/>
+          </a:bodyPr>
+          <a:lstStyle/>
+          <a:p>
+            <a:r>
+              <a:rPr lang="en-US" altLang="zh-CN" sz="1100" dirty="0"/>
+              <a:t>1..1</a:t>
+            </a:r>
+            <a:endParaRPr lang="zh-CN" altLang="en-US" sz="1100" dirty="0"/>
+          </a:p>
+        </p:txBody>
+      </p:sp>
       <p:cxnSp>
         <p:nvCxnSpPr>
-          <p:cNvPr id="81" name="Straight Connector 80"/>
+          <p:cNvPr id="89" name="Straight Connector 88"/>
           <p:cNvCxnSpPr/>
           <p:nvPr/>
         </p:nvCxnSpPr>
         <p:spPr>
           <a:xfrm>
-            <a:off x="4084307" y="3676511"/>
-            <a:ext cx="956272" cy="0"/>
+            <a:off x="1320800" y="821055"/>
+            <a:ext cx="889000" cy="0"/>
           </a:xfrm>
           <a:prstGeom prst="line">
             <a:avLst/>
@@ -5233,46 +5118,16 @@
           </a:fontRef>
         </p:style>
       </p:cxnSp>
-      <p:cxnSp>
-        <p:nvCxnSpPr>
-          <p:cNvPr id="82" name="Straight Connector 81"/>
-          <p:cNvCxnSpPr/>
-          <p:nvPr/>
-        </p:nvCxnSpPr>
-        <p:spPr>
-          <a:xfrm>
-            <a:off x="4023360" y="6256020"/>
-            <a:ext cx="1056640" cy="0"/>
-          </a:xfrm>
-          <a:prstGeom prst="line">
-            <a:avLst/>
-          </a:prstGeom>
-        </p:spPr>
-        <p:style>
-          <a:lnRef idx="1">
-            <a:schemeClr val="dk1"/>
-          </a:lnRef>
-          <a:fillRef idx="0">
-            <a:schemeClr val="dk1"/>
-          </a:fillRef>
-          <a:effectRef idx="0">
-            <a:schemeClr val="dk1"/>
-          </a:effectRef>
-          <a:fontRef idx="minor">
-            <a:schemeClr val="tx1"/>
-          </a:fontRef>
-        </p:style>
-      </p:cxnSp>
-      <p:sp>
-        <p:nvSpPr>
-          <p:cNvPr id="84" name="文本框 107"/>
+      <p:sp>
+        <p:nvSpPr>
+          <p:cNvPr id="90" name="文本框 107"/>
           <p:cNvSpPr txBox="1"/>
           <p:nvPr/>
         </p:nvSpPr>
         <p:spPr>
           <a:xfrm>
-            <a:off x="4381947" y="499472"/>
-            <a:ext cx="501983" cy="260350"/>
+            <a:off x="1567009" y="516201"/>
+            <a:ext cx="501983" cy="261610"/>
           </a:xfrm>
           <a:prstGeom prst="rect">
             <a:avLst/>
@@ -5287,246 +5142,6 @@
           <a:p>
             <a:r>
               <a:rPr lang="en-US" altLang="zh-CN" sz="1100" dirty="0"/>
-              <a:t>1..1</a:t>
-            </a:r>
-            <a:endParaRPr lang="zh-CN" altLang="en-US" sz="1100" dirty="0"/>
-          </a:p>
-        </p:txBody>
-      </p:sp>
-      <p:sp>
-        <p:nvSpPr>
-          <p:cNvPr id="85" name="文本框 107"/>
-          <p:cNvSpPr txBox="1"/>
-          <p:nvPr/>
-        </p:nvSpPr>
-        <p:spPr>
-          <a:xfrm>
-            <a:off x="4259913" y="3363853"/>
-            <a:ext cx="501983" cy="260350"/>
-          </a:xfrm>
-          <a:prstGeom prst="rect">
-            <a:avLst/>
-          </a:prstGeom>
-          <a:noFill/>
-        </p:spPr>
-        <p:txBody>
-          <a:bodyPr wrap="square" rtlCol="0">
-            <a:spAutoFit/>
-          </a:bodyPr>
-          <a:lstStyle/>
-          <a:p>
-            <a:r>
-              <a:rPr lang="en-US" altLang="zh-CN" sz="1100" dirty="0"/>
-              <a:t>1..1</a:t>
-            </a:r>
-            <a:endParaRPr lang="zh-CN" altLang="en-US" sz="1100" dirty="0"/>
-          </a:p>
-        </p:txBody>
-      </p:sp>
-      <p:sp>
-        <p:nvSpPr>
-          <p:cNvPr id="86" name="文本框 107"/>
-          <p:cNvSpPr txBox="1"/>
-          <p:nvPr/>
-        </p:nvSpPr>
-        <p:spPr>
-          <a:xfrm>
-            <a:off x="4230773" y="5941220"/>
-            <a:ext cx="501983" cy="260350"/>
-          </a:xfrm>
-          <a:prstGeom prst="rect">
-            <a:avLst/>
-          </a:prstGeom>
-          <a:noFill/>
-        </p:spPr>
-        <p:txBody>
-          <a:bodyPr wrap="square" rtlCol="0">
-            <a:spAutoFit/>
-          </a:bodyPr>
-          <a:lstStyle/>
-          <a:p>
-            <a:r>
-              <a:rPr lang="en-US" altLang="zh-CN" sz="1100" dirty="0"/>
-              <a:t>1..1</a:t>
-            </a:r>
-            <a:endParaRPr lang="zh-CN" altLang="en-US" sz="1100" dirty="0"/>
-          </a:p>
-        </p:txBody>
-      </p:sp>
-      <p:cxnSp>
-        <p:nvCxnSpPr>
-          <p:cNvPr id="87" name="Straight Connector 86"/>
-          <p:cNvCxnSpPr/>
-          <p:nvPr/>
-        </p:nvCxnSpPr>
-        <p:spPr>
-          <a:xfrm>
-            <a:off x="1143000" y="6236335"/>
-            <a:ext cx="979170" cy="0"/>
-          </a:xfrm>
-          <a:prstGeom prst="line">
-            <a:avLst/>
-          </a:prstGeom>
-        </p:spPr>
-        <p:style>
-          <a:lnRef idx="1">
-            <a:schemeClr val="dk1"/>
-          </a:lnRef>
-          <a:fillRef idx="0">
-            <a:schemeClr val="dk1"/>
-          </a:fillRef>
-          <a:effectRef idx="0">
-            <a:schemeClr val="dk1"/>
-          </a:effectRef>
-          <a:fontRef idx="minor">
-            <a:schemeClr val="tx1"/>
-          </a:fontRef>
-        </p:style>
-      </p:cxnSp>
-      <p:cxnSp>
-        <p:nvCxnSpPr>
-          <p:cNvPr id="88" name="Straight Connector 87"/>
-          <p:cNvCxnSpPr/>
-          <p:nvPr/>
-        </p:nvCxnSpPr>
-        <p:spPr>
-          <a:xfrm>
-            <a:off x="1211123" y="3654764"/>
-            <a:ext cx="956272" cy="0"/>
-          </a:xfrm>
-          <a:prstGeom prst="line">
-            <a:avLst/>
-          </a:prstGeom>
-        </p:spPr>
-        <p:style>
-          <a:lnRef idx="1">
-            <a:schemeClr val="dk1"/>
-          </a:lnRef>
-          <a:fillRef idx="0">
-            <a:schemeClr val="dk1"/>
-          </a:fillRef>
-          <a:effectRef idx="0">
-            <a:schemeClr val="dk1"/>
-          </a:effectRef>
-          <a:fontRef idx="minor">
-            <a:schemeClr val="tx1"/>
-          </a:fontRef>
-        </p:style>
-      </p:cxnSp>
-      <p:cxnSp>
-        <p:nvCxnSpPr>
-          <p:cNvPr id="89" name="Straight Connector 88"/>
-          <p:cNvCxnSpPr/>
-          <p:nvPr/>
-        </p:nvCxnSpPr>
-        <p:spPr>
-          <a:xfrm>
-            <a:off x="1320800" y="821055"/>
-            <a:ext cx="889000" cy="0"/>
-          </a:xfrm>
-          <a:prstGeom prst="line">
-            <a:avLst/>
-          </a:prstGeom>
-        </p:spPr>
-        <p:style>
-          <a:lnRef idx="1">
-            <a:schemeClr val="dk1"/>
-          </a:lnRef>
-          <a:fillRef idx="0">
-            <a:schemeClr val="dk1"/>
-          </a:fillRef>
-          <a:effectRef idx="0">
-            <a:schemeClr val="dk1"/>
-          </a:effectRef>
-          <a:fontRef idx="minor">
-            <a:schemeClr val="tx1"/>
-          </a:fontRef>
-        </p:style>
-      </p:cxnSp>
-      <p:sp>
-        <p:nvSpPr>
-          <p:cNvPr id="90" name="文本框 107"/>
-          <p:cNvSpPr txBox="1"/>
-          <p:nvPr/>
-        </p:nvSpPr>
-        <p:spPr>
-          <a:xfrm>
-            <a:off x="1567009" y="516201"/>
-            <a:ext cx="501983" cy="261610"/>
-          </a:xfrm>
-          <a:prstGeom prst="rect">
-            <a:avLst/>
-          </a:prstGeom>
-          <a:noFill/>
-        </p:spPr>
-        <p:txBody>
-          <a:bodyPr wrap="square" rtlCol="0">
-            <a:spAutoFit/>
-          </a:bodyPr>
-          <a:lstStyle/>
-          <a:p>
-            <a:r>
-              <a:rPr lang="en-US" altLang="zh-CN" sz="1100" dirty="0"/>
-              <a:t>0..*</a:t>
-            </a:r>
-            <a:endParaRPr lang="zh-CN" altLang="en-US" sz="1100" dirty="0"/>
-          </a:p>
-        </p:txBody>
-      </p:sp>
-      <p:sp>
-        <p:nvSpPr>
-          <p:cNvPr id="93" name="文本框 107"/>
-          <p:cNvSpPr txBox="1"/>
-          <p:nvPr/>
-        </p:nvSpPr>
-        <p:spPr>
-          <a:xfrm>
-            <a:off x="1457874" y="3300538"/>
-            <a:ext cx="501983" cy="261610"/>
-          </a:xfrm>
-          <a:prstGeom prst="rect">
-            <a:avLst/>
-          </a:prstGeom>
-          <a:noFill/>
-        </p:spPr>
-        <p:txBody>
-          <a:bodyPr wrap="square" rtlCol="0">
-            <a:spAutoFit/>
-          </a:bodyPr>
-          <a:lstStyle/>
-          <a:p>
-            <a:r>
-              <a:rPr lang="en-US" altLang="zh-CN" sz="1100" dirty="0"/>
-              <a:t>0..*</a:t>
-            </a:r>
-            <a:endParaRPr lang="zh-CN" altLang="en-US" sz="1100" dirty="0"/>
-          </a:p>
-        </p:txBody>
-      </p:sp>
-      <p:sp>
-        <p:nvSpPr>
-          <p:cNvPr id="94" name="文本框 107"/>
-          <p:cNvSpPr txBox="1"/>
-          <p:nvPr/>
-        </p:nvSpPr>
-        <p:spPr>
-          <a:xfrm>
-            <a:off x="1362560" y="5894919"/>
-            <a:ext cx="501983" cy="261610"/>
-          </a:xfrm>
-          <a:prstGeom prst="rect">
-            <a:avLst/>
-          </a:prstGeom>
-          <a:noFill/>
-        </p:spPr>
-        <p:txBody>
-          <a:bodyPr wrap="square" rtlCol="0">
-            <a:spAutoFit/>
-          </a:bodyPr>
-          <a:lstStyle/>
-          <a:p>
-            <a:r>
-              <a:rPr lang="en-US" altLang="zh-CN" sz="1100" dirty="0"/>
               <a:t>0..*</a:t>
             </a:r>
             <a:endParaRPr lang="zh-CN" altLang="en-US" sz="1100" dirty="0"/>
@@ -5543,66 +5158,6 @@
           <a:xfrm flipV="1">
             <a:off x="1333500" y="-101600"/>
             <a:ext cx="0" cy="927100"/>
-          </a:xfrm>
-          <a:prstGeom prst="line">
-            <a:avLst/>
-          </a:prstGeom>
-        </p:spPr>
-        <p:style>
-          <a:lnRef idx="1">
-            <a:schemeClr val="dk1"/>
-          </a:lnRef>
-          <a:fillRef idx="0">
-            <a:schemeClr val="dk1"/>
-          </a:fillRef>
-          <a:effectRef idx="0">
-            <a:schemeClr val="dk1"/>
-          </a:effectRef>
-          <a:fontRef idx="minor">
-            <a:schemeClr val="tx1"/>
-          </a:fontRef>
-        </p:style>
-      </p:cxnSp>
-      <p:cxnSp>
-        <p:nvCxnSpPr>
-          <p:cNvPr id="3" name="Straight Connector 2"/>
-          <p:cNvCxnSpPr/>
-          <p:nvPr/>
-        </p:nvCxnSpPr>
-        <p:spPr>
-          <a:xfrm flipV="1">
-            <a:off x="1130300" y="0"/>
-            <a:ext cx="0" cy="6254750"/>
-          </a:xfrm>
-          <a:prstGeom prst="line">
-            <a:avLst/>
-          </a:prstGeom>
-        </p:spPr>
-        <p:style>
-          <a:lnRef idx="1">
-            <a:schemeClr val="dk1"/>
-          </a:lnRef>
-          <a:fillRef idx="0">
-            <a:schemeClr val="dk1"/>
-          </a:fillRef>
-          <a:effectRef idx="0">
-            <a:schemeClr val="dk1"/>
-          </a:effectRef>
-          <a:fontRef idx="minor">
-            <a:schemeClr val="tx1"/>
-          </a:fontRef>
-        </p:style>
-      </p:cxnSp>
-      <p:cxnSp>
-        <p:nvCxnSpPr>
-          <p:cNvPr id="4" name="Straight Connector 3"/>
-          <p:cNvCxnSpPr/>
-          <p:nvPr/>
-        </p:nvCxnSpPr>
-        <p:spPr>
-          <a:xfrm flipV="1">
-            <a:off x="1231900" y="0"/>
-            <a:ext cx="0" cy="3670300"/>
           </a:xfrm>
           <a:prstGeom prst="line">
             <a:avLst/>
@@ -7035,1104 +6590,6 @@
           </a:fillRef>
           <a:effectRef idx="0">
             <a:schemeClr val="dk1"/>
-          </a:effectRef>
-          <a:fontRef idx="minor">
-            <a:schemeClr val="tx1"/>
-          </a:fontRef>
-        </p:style>
-      </p:cxnSp>
-    </p:spTree>
-  </p:cSld>
-  <p:clrMapOvr>
-    <a:masterClrMapping/>
-  </p:clrMapOvr>
-</p:sld>
-</file>
-
-<file path=ppt/slides/slide4.xml><?xml version="1.0" encoding="utf-8"?>
-<p:sld xmlns:a="http://schemas.openxmlformats.org/drawingml/2006/main" xmlns:r="http://schemas.openxmlformats.org/officeDocument/2006/relationships" xmlns:p="http://schemas.openxmlformats.org/presentationml/2006/main">
-  <p:cSld>
-    <p:spTree>
-      <p:nvGrpSpPr>
-        <p:cNvPr id="1" name=""/>
-        <p:cNvGrpSpPr/>
-        <p:nvPr/>
-      </p:nvGrpSpPr>
-      <p:grpSpPr/>
-      <p:sp>
-        <p:nvSpPr>
-          <p:cNvPr id="4" name="流程图: 过程 3"/>
-          <p:cNvSpPr/>
-          <p:nvPr/>
-        </p:nvSpPr>
-        <p:spPr>
-          <a:xfrm>
-            <a:off x="5205318" y="2407389"/>
-            <a:ext cx="1950965" cy="419765"/>
-          </a:xfrm>
-          <a:prstGeom prst="flowChartProcess">
-            <a:avLst/>
-          </a:prstGeom>
-          <a:ln w="12700">
-            <a:solidFill>
-              <a:schemeClr val="bg2">
-                <a:lumMod val="10000"/>
-              </a:schemeClr>
-            </a:solidFill>
-          </a:ln>
-        </p:spPr>
-        <p:style>
-          <a:lnRef idx="1">
-            <a:schemeClr val="accent6"/>
-          </a:lnRef>
-          <a:fillRef idx="2">
-            <a:schemeClr val="accent6"/>
-          </a:fillRef>
-          <a:effectRef idx="1">
-            <a:schemeClr val="accent6"/>
-          </a:effectRef>
-          <a:fontRef idx="minor">
-            <a:schemeClr val="dk1"/>
-          </a:fontRef>
-        </p:style>
-        <p:txBody>
-          <a:bodyPr rtlCol="0" anchor="ctr"/>
-          <a:p>
-            <a:pPr algn="ctr"/>
-            <a:r>
-              <a:rPr lang="en-US" altLang="zh-CN" dirty="0"/>
-              <a:t>image</a:t>
-            </a:r>
-            <a:endParaRPr lang="en-US" altLang="zh-CN" dirty="0"/>
-          </a:p>
-        </p:txBody>
-      </p:sp>
-      <p:sp>
-        <p:nvSpPr>
-          <p:cNvPr id="7" name="流程图: 过程 4"/>
-          <p:cNvSpPr/>
-          <p:nvPr/>
-        </p:nvSpPr>
-        <p:spPr>
-          <a:xfrm>
-            <a:off x="5208905" y="2827020"/>
-            <a:ext cx="1943735" cy="977900"/>
-          </a:xfrm>
-          <a:prstGeom prst="flowChartProcess">
-            <a:avLst/>
-          </a:prstGeom>
-          <a:ln>
-            <a:solidFill>
-              <a:schemeClr val="bg2">
-                <a:lumMod val="10000"/>
-              </a:schemeClr>
-            </a:solidFill>
-          </a:ln>
-        </p:spPr>
-        <p:style>
-          <a:lnRef idx="2">
-            <a:schemeClr val="accent6"/>
-          </a:lnRef>
-          <a:fillRef idx="1">
-            <a:schemeClr val="lt1"/>
-          </a:fillRef>
-          <a:effectRef idx="0">
-            <a:schemeClr val="accent6"/>
-          </a:effectRef>
-          <a:fontRef idx="minor">
-            <a:schemeClr val="dk1"/>
-          </a:fontRef>
-        </p:style>
-        <p:txBody>
-          <a:bodyPr rtlCol="0" anchor="ctr"/>
-          <a:p>
-            <a:pPr algn="ctr"/>
-            <a:r>
-              <a:rPr lang="en-US" altLang="zh-CN" u="sng" dirty="0" err="1"/>
-              <a:t>image_id</a:t>
-            </a:r>
-            <a:endParaRPr lang="en-US" altLang="zh-CN" u="sng" dirty="0" err="1"/>
-          </a:p>
-          <a:p>
-            <a:pPr algn="ctr"/>
-            <a:r>
-              <a:rPr lang="en-US" altLang="zh-CN" dirty="0"/>
-              <a:t>image_name</a:t>
-            </a:r>
-            <a:endParaRPr lang="en-US" altLang="zh-CN" dirty="0"/>
-          </a:p>
-          <a:p>
-            <a:pPr algn="ctr"/>
-            <a:r>
-              <a:rPr lang="en-US" altLang="zh-CN" dirty="0"/>
-              <a:t>image_url</a:t>
-            </a:r>
-            <a:endParaRPr lang="en-US" altLang="zh-CN" dirty="0"/>
-          </a:p>
-        </p:txBody>
-      </p:sp>
-      <p:sp>
-        <p:nvSpPr>
-          <p:cNvPr id="5" name="流程图: 过程 3"/>
-          <p:cNvSpPr/>
-          <p:nvPr/>
-        </p:nvSpPr>
-        <p:spPr>
-          <a:xfrm>
-            <a:off x="5200238" y="480164"/>
-            <a:ext cx="1950965" cy="419765"/>
-          </a:xfrm>
-          <a:prstGeom prst="flowChartProcess">
-            <a:avLst/>
-          </a:prstGeom>
-          <a:ln w="12700">
-            <a:solidFill>
-              <a:schemeClr val="bg2">
-                <a:lumMod val="10000"/>
-              </a:schemeClr>
-            </a:solidFill>
-          </a:ln>
-        </p:spPr>
-        <p:style>
-          <a:lnRef idx="1">
-            <a:schemeClr val="accent6"/>
-          </a:lnRef>
-          <a:fillRef idx="2">
-            <a:schemeClr val="accent6"/>
-          </a:fillRef>
-          <a:effectRef idx="1">
-            <a:schemeClr val="accent6"/>
-          </a:effectRef>
-          <a:fontRef idx="minor">
-            <a:schemeClr val="dk1"/>
-          </a:fontRef>
-        </p:style>
-        <p:txBody>
-          <a:bodyPr rtlCol="0" anchor="ctr"/>
-          <a:p>
-            <a:pPr algn="ctr"/>
-            <a:r>
-              <a:rPr lang="en-US" altLang="zh-CN" dirty="0"/>
-              <a:t>video</a:t>
-            </a:r>
-            <a:endParaRPr lang="en-US" altLang="zh-CN" dirty="0"/>
-          </a:p>
-        </p:txBody>
-      </p:sp>
-      <p:sp>
-        <p:nvSpPr>
-          <p:cNvPr id="6" name="流程图: 过程 4"/>
-          <p:cNvSpPr/>
-          <p:nvPr/>
-        </p:nvSpPr>
-        <p:spPr>
-          <a:xfrm>
-            <a:off x="5205095" y="883920"/>
-            <a:ext cx="1943735" cy="977900"/>
-          </a:xfrm>
-          <a:prstGeom prst="flowChartProcess">
-            <a:avLst/>
-          </a:prstGeom>
-          <a:ln>
-            <a:solidFill>
-              <a:schemeClr val="bg2">
-                <a:lumMod val="10000"/>
-              </a:schemeClr>
-            </a:solidFill>
-          </a:ln>
-        </p:spPr>
-        <p:style>
-          <a:lnRef idx="2">
-            <a:schemeClr val="accent6"/>
-          </a:lnRef>
-          <a:fillRef idx="1">
-            <a:schemeClr val="lt1"/>
-          </a:fillRef>
-          <a:effectRef idx="0">
-            <a:schemeClr val="accent6"/>
-          </a:effectRef>
-          <a:fontRef idx="minor">
-            <a:schemeClr val="dk1"/>
-          </a:fontRef>
-        </p:style>
-        <p:txBody>
-          <a:bodyPr rtlCol="0" anchor="ctr"/>
-          <a:p>
-            <a:pPr algn="ctr"/>
-            <a:r>
-              <a:rPr lang="en-US" altLang="zh-CN" u="sng" dirty="0" err="1"/>
-              <a:t>video_id</a:t>
-            </a:r>
-            <a:endParaRPr lang="en-US" altLang="zh-CN" u="sng" dirty="0" err="1"/>
-          </a:p>
-          <a:p>
-            <a:pPr algn="ctr"/>
-            <a:r>
-              <a:rPr lang="en-US" altLang="zh-CN" dirty="0"/>
-              <a:t>video_name</a:t>
-            </a:r>
-            <a:endParaRPr lang="en-US" altLang="zh-CN" dirty="0"/>
-          </a:p>
-          <a:p>
-            <a:pPr algn="ctr"/>
-            <a:r>
-              <a:rPr lang="en-US" altLang="zh-CN" dirty="0"/>
-              <a:t>video_url</a:t>
-            </a:r>
-            <a:endParaRPr lang="en-US" altLang="zh-CN" dirty="0"/>
-          </a:p>
-        </p:txBody>
-      </p:sp>
-      <p:sp>
-        <p:nvSpPr>
-          <p:cNvPr id="11" name="流程图: 决策 5"/>
-          <p:cNvSpPr/>
-          <p:nvPr/>
-        </p:nvSpPr>
-        <p:spPr>
-          <a:xfrm>
-            <a:off x="8114030" y="925195"/>
-            <a:ext cx="1943735" cy="721360"/>
-          </a:xfrm>
-          <a:prstGeom prst="flowChartDecision">
-            <a:avLst/>
-          </a:prstGeom>
-          <a:solidFill>
-            <a:schemeClr val="accent6">
-              <a:lumMod val="40000"/>
-              <a:lumOff val="60000"/>
-              <a:alpha val="50000"/>
-            </a:schemeClr>
-          </a:solidFill>
-          <a:ln>
-            <a:solidFill>
-              <a:schemeClr val="tx1"/>
-            </a:solidFill>
-          </a:ln>
-        </p:spPr>
-        <p:style>
-          <a:lnRef idx="0">
-            <a:scrgbClr r="0" g="0" b="0"/>
-          </a:lnRef>
-          <a:fillRef idx="0">
-            <a:scrgbClr r="0" g="0" b="0"/>
-          </a:fillRef>
-          <a:effectRef idx="0">
-            <a:scrgbClr r="0" g="0" b="0"/>
-          </a:effectRef>
-          <a:fontRef idx="minor">
-            <a:schemeClr val="lt1"/>
-          </a:fontRef>
-        </p:style>
-        <p:txBody>
-          <a:bodyPr rtlCol="0" anchor="ctr"/>
-          <a:p>
-            <a:pPr algn="ctr"/>
-            <a:r>
-              <a:rPr lang="en-US" altLang="zh-CN" sz="1000" dirty="0">
-                <a:solidFill>
-                  <a:schemeClr val="tx1"/>
-                </a:solidFill>
-              </a:rPr>
-              <a:t>video_note</a:t>
-            </a:r>
-            <a:endParaRPr lang="en-US" altLang="zh-CN" sz="1000" dirty="0">
-              <a:solidFill>
-                <a:schemeClr val="tx1"/>
-              </a:solidFill>
-            </a:endParaRPr>
-          </a:p>
-        </p:txBody>
-      </p:sp>
-      <p:sp>
-        <p:nvSpPr>
-          <p:cNvPr id="12" name="文本框 107"/>
-          <p:cNvSpPr txBox="1"/>
-          <p:nvPr/>
-        </p:nvSpPr>
-        <p:spPr>
-          <a:xfrm>
-            <a:off x="10267396" y="994689"/>
-            <a:ext cx="501983" cy="260350"/>
-          </a:xfrm>
-          <a:prstGeom prst="rect">
-            <a:avLst/>
-          </a:prstGeom>
-          <a:noFill/>
-        </p:spPr>
-        <p:txBody>
-          <a:bodyPr wrap="square" rtlCol="0">
-            <a:spAutoFit/>
-          </a:bodyPr>
-          <a:p>
-            <a:r>
-              <a:rPr lang="en-US" altLang="zh-CN" sz="1100" dirty="0"/>
-              <a:t>0..*</a:t>
-            </a:r>
-            <a:endParaRPr lang="en-US" altLang="zh-CN" sz="1100" dirty="0"/>
-          </a:p>
-        </p:txBody>
-      </p:sp>
-      <p:cxnSp>
-        <p:nvCxnSpPr>
-          <p:cNvPr id="13" name="Straight Connector 12"/>
-          <p:cNvCxnSpPr/>
-          <p:nvPr/>
-        </p:nvCxnSpPr>
-        <p:spPr>
-          <a:xfrm>
-            <a:off x="7157854" y="1286593"/>
-            <a:ext cx="956272" cy="0"/>
-          </a:xfrm>
-          <a:prstGeom prst="line">
-            <a:avLst/>
-          </a:prstGeom>
-        </p:spPr>
-        <p:style>
-          <a:lnRef idx="1">
-            <a:schemeClr val="dk1"/>
-          </a:lnRef>
-          <a:fillRef idx="0">
-            <a:schemeClr val="dk1"/>
-          </a:fillRef>
-          <a:effectRef idx="0">
-            <a:schemeClr val="dk1"/>
-          </a:effectRef>
-          <a:fontRef idx="minor">
-            <a:schemeClr val="tx1"/>
-          </a:fontRef>
-        </p:style>
-      </p:cxnSp>
-      <p:sp>
-        <p:nvSpPr>
-          <p:cNvPr id="14" name="文本框 107"/>
-          <p:cNvSpPr txBox="1"/>
-          <p:nvPr/>
-        </p:nvSpPr>
-        <p:spPr>
-          <a:xfrm>
-            <a:off x="7471276" y="981650"/>
-            <a:ext cx="501983" cy="260350"/>
-          </a:xfrm>
-          <a:prstGeom prst="rect">
-            <a:avLst/>
-          </a:prstGeom>
-          <a:noFill/>
-        </p:spPr>
-        <p:txBody>
-          <a:bodyPr wrap="square" rtlCol="0">
-            <a:spAutoFit/>
-          </a:bodyPr>
-          <a:p>
-            <a:r>
-              <a:rPr lang="en-US" altLang="zh-CN" sz="1100" dirty="0"/>
-              <a:t>0..1</a:t>
-            </a:r>
-            <a:endParaRPr lang="en-US" altLang="zh-CN" sz="1100" dirty="0"/>
-          </a:p>
-        </p:txBody>
-      </p:sp>
-      <p:cxnSp>
-        <p:nvCxnSpPr>
-          <p:cNvPr id="15" name="Straight Connector 14"/>
-          <p:cNvCxnSpPr/>
-          <p:nvPr/>
-        </p:nvCxnSpPr>
-        <p:spPr>
-          <a:xfrm>
-            <a:off x="10063106" y="1286117"/>
-            <a:ext cx="956272" cy="0"/>
-          </a:xfrm>
-          <a:prstGeom prst="line">
-            <a:avLst/>
-          </a:prstGeom>
-        </p:spPr>
-        <p:style>
-          <a:lnRef idx="1">
-            <a:schemeClr val="dk1"/>
-          </a:lnRef>
-          <a:fillRef idx="0">
-            <a:schemeClr val="dk1"/>
-          </a:fillRef>
-          <a:effectRef idx="0">
-            <a:schemeClr val="dk1"/>
-          </a:effectRef>
-          <a:fontRef idx="minor">
-            <a:schemeClr val="tx1"/>
-          </a:fontRef>
-        </p:style>
-      </p:cxnSp>
-      <p:sp>
-        <p:nvSpPr>
-          <p:cNvPr id="8" name="流程图: 决策 5"/>
-          <p:cNvSpPr/>
-          <p:nvPr/>
-        </p:nvSpPr>
-        <p:spPr>
-          <a:xfrm>
-            <a:off x="8114126" y="2868395"/>
-            <a:ext cx="1943954" cy="721643"/>
-          </a:xfrm>
-          <a:prstGeom prst="flowChartDecision">
-            <a:avLst/>
-          </a:prstGeom>
-          <a:solidFill>
-            <a:schemeClr val="accent6">
-              <a:lumMod val="40000"/>
-              <a:lumOff val="60000"/>
-              <a:alpha val="50000"/>
-            </a:schemeClr>
-          </a:solidFill>
-          <a:ln>
-            <a:solidFill>
-              <a:schemeClr val="tx1"/>
-            </a:solidFill>
-          </a:ln>
-        </p:spPr>
-        <p:style>
-          <a:lnRef idx="0">
-            <a:scrgbClr r="0" g="0" b="0"/>
-          </a:lnRef>
-          <a:fillRef idx="0">
-            <a:scrgbClr r="0" g="0" b="0"/>
-          </a:fillRef>
-          <a:effectRef idx="0">
-            <a:scrgbClr r="0" g="0" b="0"/>
-          </a:effectRef>
-          <a:fontRef idx="minor">
-            <a:schemeClr val="lt1"/>
-          </a:fontRef>
-        </p:style>
-        <p:txBody>
-          <a:bodyPr rtlCol="0" anchor="ctr"/>
-          <a:p>
-            <a:pPr algn="ctr"/>
-            <a:r>
-              <a:rPr lang="en-US" altLang="zh-CN" sz="1000" dirty="0">
-                <a:solidFill>
-                  <a:schemeClr val="tx1"/>
-                </a:solidFill>
-              </a:rPr>
-              <a:t>image_node</a:t>
-            </a:r>
-            <a:endParaRPr lang="en-US" altLang="zh-CN" sz="1000" dirty="0">
-              <a:solidFill>
-                <a:schemeClr val="tx1"/>
-              </a:solidFill>
-            </a:endParaRPr>
-          </a:p>
-        </p:txBody>
-      </p:sp>
-      <p:sp>
-        <p:nvSpPr>
-          <p:cNvPr id="9" name="文本框 107"/>
-          <p:cNvSpPr txBox="1"/>
-          <p:nvPr/>
-        </p:nvSpPr>
-        <p:spPr>
-          <a:xfrm>
-            <a:off x="10198816" y="2925089"/>
-            <a:ext cx="501983" cy="260350"/>
-          </a:xfrm>
-          <a:prstGeom prst="rect">
-            <a:avLst/>
-          </a:prstGeom>
-          <a:noFill/>
-        </p:spPr>
-        <p:txBody>
-          <a:bodyPr wrap="square" rtlCol="0">
-            <a:spAutoFit/>
-          </a:bodyPr>
-          <a:p>
-            <a:r>
-              <a:rPr lang="en-US" altLang="zh-CN" sz="1100" dirty="0"/>
-              <a:t>0..*</a:t>
-            </a:r>
-            <a:endParaRPr lang="zh-CN" altLang="en-US" sz="1100" dirty="0"/>
-          </a:p>
-        </p:txBody>
-      </p:sp>
-      <p:cxnSp>
-        <p:nvCxnSpPr>
-          <p:cNvPr id="10" name="Straight Connector 9"/>
-          <p:cNvCxnSpPr/>
-          <p:nvPr/>
-        </p:nvCxnSpPr>
-        <p:spPr>
-          <a:xfrm>
-            <a:off x="7157854" y="3229693"/>
-            <a:ext cx="956272" cy="0"/>
-          </a:xfrm>
-          <a:prstGeom prst="line">
-            <a:avLst/>
-          </a:prstGeom>
-        </p:spPr>
-        <p:style>
-          <a:lnRef idx="1">
-            <a:schemeClr val="dk1"/>
-          </a:lnRef>
-          <a:fillRef idx="0">
-            <a:schemeClr val="dk1"/>
-          </a:fillRef>
-          <a:effectRef idx="0">
-            <a:schemeClr val="dk1"/>
-          </a:effectRef>
-          <a:fontRef idx="minor">
-            <a:schemeClr val="tx1"/>
-          </a:fontRef>
-        </p:style>
-      </p:cxnSp>
-      <p:sp>
-        <p:nvSpPr>
-          <p:cNvPr id="16" name="文本框 107"/>
-          <p:cNvSpPr txBox="1"/>
-          <p:nvPr/>
-        </p:nvSpPr>
-        <p:spPr>
-          <a:xfrm>
-            <a:off x="7471276" y="2924750"/>
-            <a:ext cx="501983" cy="260350"/>
-          </a:xfrm>
-          <a:prstGeom prst="rect">
-            <a:avLst/>
-          </a:prstGeom>
-          <a:noFill/>
-        </p:spPr>
-        <p:txBody>
-          <a:bodyPr wrap="square" rtlCol="0">
-            <a:spAutoFit/>
-          </a:bodyPr>
-          <a:p>
-            <a:r>
-              <a:rPr lang="en-US" altLang="zh-CN" sz="1100" dirty="0"/>
-              <a:t>0..1</a:t>
-            </a:r>
-            <a:endParaRPr lang="zh-CN" altLang="en-US" sz="1100" dirty="0"/>
-          </a:p>
-        </p:txBody>
-      </p:sp>
-      <p:cxnSp>
-        <p:nvCxnSpPr>
-          <p:cNvPr id="17" name="Straight Connector 16"/>
-          <p:cNvCxnSpPr/>
-          <p:nvPr/>
-        </p:nvCxnSpPr>
-        <p:spPr>
-          <a:xfrm>
-            <a:off x="10062845" y="3228975"/>
-            <a:ext cx="871855" cy="0"/>
-          </a:xfrm>
-          <a:prstGeom prst="line">
-            <a:avLst/>
-          </a:prstGeom>
-        </p:spPr>
-        <p:style>
-          <a:lnRef idx="1">
-            <a:schemeClr val="dk1"/>
-          </a:lnRef>
-          <a:fillRef idx="0">
-            <a:schemeClr val="dk1"/>
-          </a:fillRef>
-          <a:effectRef idx="0">
-            <a:schemeClr val="dk1"/>
-          </a:effectRef>
-          <a:fontRef idx="minor">
-            <a:schemeClr val="tx1"/>
-          </a:fontRef>
-        </p:style>
-      </p:cxnSp>
-      <p:sp>
-        <p:nvSpPr>
-          <p:cNvPr id="18" name="流程图: 决策 5"/>
-          <p:cNvSpPr/>
-          <p:nvPr/>
-        </p:nvSpPr>
-        <p:spPr>
-          <a:xfrm>
-            <a:off x="2284730" y="925195"/>
-            <a:ext cx="1943735" cy="721360"/>
-          </a:xfrm>
-          <a:prstGeom prst="flowChartDecision">
-            <a:avLst/>
-          </a:prstGeom>
-          <a:solidFill>
-            <a:schemeClr val="accent6">
-              <a:lumMod val="40000"/>
-              <a:lumOff val="60000"/>
-              <a:alpha val="50000"/>
-            </a:schemeClr>
-          </a:solidFill>
-          <a:ln>
-            <a:solidFill>
-              <a:schemeClr val="tx1"/>
-            </a:solidFill>
-          </a:ln>
-        </p:spPr>
-        <p:style>
-          <a:lnRef idx="0">
-            <a:scrgbClr r="0" g="0" b="0"/>
-          </a:lnRef>
-          <a:fillRef idx="0">
-            <a:scrgbClr r="0" g="0" b="0"/>
-          </a:fillRef>
-          <a:effectRef idx="0">
-            <a:scrgbClr r="0" g="0" b="0"/>
-          </a:effectRef>
-          <a:fontRef idx="minor">
-            <a:schemeClr val="lt1"/>
-          </a:fontRef>
-        </p:style>
-        <p:txBody>
-          <a:bodyPr rtlCol="0" anchor="ctr"/>
-          <a:p>
-            <a:pPr algn="ctr"/>
-            <a:r>
-              <a:rPr lang="en-US" altLang="zh-CN" sz="1000" dirty="0">
-                <a:solidFill>
-                  <a:schemeClr val="tx1"/>
-                </a:solidFill>
-              </a:rPr>
-              <a:t>video_problem</a:t>
-            </a:r>
-            <a:endParaRPr lang="en-US" altLang="zh-CN" sz="1000" dirty="0">
-              <a:solidFill>
-                <a:schemeClr val="tx1"/>
-              </a:solidFill>
-            </a:endParaRPr>
-          </a:p>
-        </p:txBody>
-      </p:sp>
-      <p:sp>
-        <p:nvSpPr>
-          <p:cNvPr id="19" name="文本框 107"/>
-          <p:cNvSpPr txBox="1"/>
-          <p:nvPr/>
-        </p:nvSpPr>
-        <p:spPr>
-          <a:xfrm>
-            <a:off x="4438096" y="994689"/>
-            <a:ext cx="501983" cy="260350"/>
-          </a:xfrm>
-          <a:prstGeom prst="rect">
-            <a:avLst/>
-          </a:prstGeom>
-          <a:noFill/>
-        </p:spPr>
-        <p:txBody>
-          <a:bodyPr wrap="square" rtlCol="0">
-            <a:spAutoFit/>
-          </a:bodyPr>
-          <a:p>
-            <a:r>
-              <a:rPr lang="en-US" altLang="zh-CN" sz="1100" dirty="0"/>
-              <a:t>0..1</a:t>
-            </a:r>
-            <a:endParaRPr lang="en-US" altLang="zh-CN" sz="1100" dirty="0"/>
-          </a:p>
-        </p:txBody>
-      </p:sp>
-      <p:cxnSp>
-        <p:nvCxnSpPr>
-          <p:cNvPr id="20" name="Straight Connector 19"/>
-          <p:cNvCxnSpPr/>
-          <p:nvPr/>
-        </p:nvCxnSpPr>
-        <p:spPr>
-          <a:xfrm>
-            <a:off x="1295400" y="1286510"/>
-            <a:ext cx="989330" cy="0"/>
-          </a:xfrm>
-          <a:prstGeom prst="line">
-            <a:avLst/>
-          </a:prstGeom>
-        </p:spPr>
-        <p:style>
-          <a:lnRef idx="1">
-            <a:schemeClr val="dk1"/>
-          </a:lnRef>
-          <a:fillRef idx="0">
-            <a:schemeClr val="dk1"/>
-          </a:fillRef>
-          <a:effectRef idx="0">
-            <a:schemeClr val="dk1"/>
-          </a:effectRef>
-          <a:fontRef idx="minor">
-            <a:schemeClr val="tx1"/>
-          </a:fontRef>
-        </p:style>
-      </p:cxnSp>
-      <p:sp>
-        <p:nvSpPr>
-          <p:cNvPr id="21" name="文本框 107"/>
-          <p:cNvSpPr txBox="1"/>
-          <p:nvPr/>
-        </p:nvSpPr>
-        <p:spPr>
-          <a:xfrm>
-            <a:off x="1641976" y="981650"/>
-            <a:ext cx="501983" cy="260350"/>
-          </a:xfrm>
-          <a:prstGeom prst="rect">
-            <a:avLst/>
-          </a:prstGeom>
-          <a:noFill/>
-        </p:spPr>
-        <p:txBody>
-          <a:bodyPr wrap="square" rtlCol="0">
-            <a:spAutoFit/>
-          </a:bodyPr>
-          <a:p>
-            <a:r>
-              <a:rPr lang="en-US" altLang="zh-CN" sz="1100" dirty="0"/>
-              <a:t>0..*</a:t>
-            </a:r>
-            <a:endParaRPr lang="en-US" altLang="zh-CN" sz="1100" dirty="0"/>
-          </a:p>
-        </p:txBody>
-      </p:sp>
-      <p:cxnSp>
-        <p:nvCxnSpPr>
-          <p:cNvPr id="22" name="Straight Connector 21"/>
-          <p:cNvCxnSpPr/>
-          <p:nvPr/>
-        </p:nvCxnSpPr>
-        <p:spPr>
-          <a:xfrm>
-            <a:off x="4233806" y="1286117"/>
-            <a:ext cx="956272" cy="0"/>
-          </a:xfrm>
-          <a:prstGeom prst="line">
-            <a:avLst/>
-          </a:prstGeom>
-        </p:spPr>
-        <p:style>
-          <a:lnRef idx="1">
-            <a:schemeClr val="dk1"/>
-          </a:lnRef>
-          <a:fillRef idx="0">
-            <a:schemeClr val="dk1"/>
-          </a:fillRef>
-          <a:effectRef idx="0">
-            <a:schemeClr val="dk1"/>
-          </a:effectRef>
-          <a:fontRef idx="minor">
-            <a:schemeClr val="tx1"/>
-          </a:fontRef>
-        </p:style>
-      </p:cxnSp>
-      <p:sp>
-        <p:nvSpPr>
-          <p:cNvPr id="23" name="流程图: 决策 5"/>
-          <p:cNvSpPr/>
-          <p:nvPr/>
-        </p:nvSpPr>
-        <p:spPr>
-          <a:xfrm>
-            <a:off x="2297430" y="2855595"/>
-            <a:ext cx="1943735" cy="721360"/>
-          </a:xfrm>
-          <a:prstGeom prst="flowChartDecision">
-            <a:avLst/>
-          </a:prstGeom>
-          <a:solidFill>
-            <a:schemeClr val="accent6">
-              <a:lumMod val="40000"/>
-              <a:lumOff val="60000"/>
-              <a:alpha val="50000"/>
-            </a:schemeClr>
-          </a:solidFill>
-          <a:ln>
-            <a:solidFill>
-              <a:schemeClr val="tx1"/>
-            </a:solidFill>
-          </a:ln>
-        </p:spPr>
-        <p:style>
-          <a:lnRef idx="0">
-            <a:scrgbClr r="0" g="0" b="0"/>
-          </a:lnRef>
-          <a:fillRef idx="0">
-            <a:scrgbClr r="0" g="0" b="0"/>
-          </a:fillRef>
-          <a:effectRef idx="0">
-            <a:scrgbClr r="0" g="0" b="0"/>
-          </a:effectRef>
-          <a:fontRef idx="minor">
-            <a:schemeClr val="lt1"/>
-          </a:fontRef>
-        </p:style>
-        <p:txBody>
-          <a:bodyPr rtlCol="0" anchor="ctr"/>
-          <a:p>
-            <a:pPr algn="ctr"/>
-            <a:r>
-              <a:rPr lang="en-US" altLang="zh-CN" sz="1000" dirty="0">
-                <a:solidFill>
-                  <a:schemeClr val="tx1"/>
-                </a:solidFill>
-              </a:rPr>
-              <a:t>image_problem</a:t>
-            </a:r>
-            <a:endParaRPr lang="en-US" altLang="zh-CN" sz="1000" dirty="0">
-              <a:solidFill>
-                <a:schemeClr val="tx1"/>
-              </a:solidFill>
-            </a:endParaRPr>
-          </a:p>
-        </p:txBody>
-      </p:sp>
-      <p:sp>
-        <p:nvSpPr>
-          <p:cNvPr id="24" name="文本框 107"/>
-          <p:cNvSpPr txBox="1"/>
-          <p:nvPr/>
-        </p:nvSpPr>
-        <p:spPr>
-          <a:xfrm>
-            <a:off x="4450796" y="2925089"/>
-            <a:ext cx="501983" cy="260350"/>
-          </a:xfrm>
-          <a:prstGeom prst="rect">
-            <a:avLst/>
-          </a:prstGeom>
-          <a:noFill/>
-        </p:spPr>
-        <p:txBody>
-          <a:bodyPr wrap="square" rtlCol="0">
-            <a:spAutoFit/>
-          </a:bodyPr>
-          <a:p>
-            <a:r>
-              <a:rPr lang="en-US" altLang="zh-CN" sz="1100" dirty="0"/>
-              <a:t>0..1</a:t>
-            </a:r>
-            <a:endParaRPr lang="en-US" altLang="zh-CN" sz="1100" dirty="0"/>
-          </a:p>
-        </p:txBody>
-      </p:sp>
-      <p:sp>
-        <p:nvSpPr>
-          <p:cNvPr id="25" name="文本框 107"/>
-          <p:cNvSpPr txBox="1"/>
-          <p:nvPr/>
-        </p:nvSpPr>
-        <p:spPr>
-          <a:xfrm>
-            <a:off x="1654676" y="2912050"/>
-            <a:ext cx="501983" cy="260350"/>
-          </a:xfrm>
-          <a:prstGeom prst="rect">
-            <a:avLst/>
-          </a:prstGeom>
-          <a:noFill/>
-        </p:spPr>
-        <p:txBody>
-          <a:bodyPr wrap="square" rtlCol="0">
-            <a:spAutoFit/>
-          </a:bodyPr>
-          <a:p>
-            <a:r>
-              <a:rPr lang="en-US" altLang="zh-CN" sz="1100" dirty="0"/>
-              <a:t>0..*</a:t>
-            </a:r>
-            <a:endParaRPr lang="en-US" altLang="zh-CN" sz="1100" dirty="0"/>
-          </a:p>
-        </p:txBody>
-      </p:sp>
-      <p:cxnSp>
-        <p:nvCxnSpPr>
-          <p:cNvPr id="26" name="Straight Connector 25"/>
-          <p:cNvCxnSpPr/>
-          <p:nvPr/>
-        </p:nvCxnSpPr>
-        <p:spPr>
-          <a:xfrm>
-            <a:off x="4246506" y="3216517"/>
-            <a:ext cx="956272" cy="0"/>
-          </a:xfrm>
-          <a:prstGeom prst="line">
-            <a:avLst/>
-          </a:prstGeom>
-        </p:spPr>
-        <p:style>
-          <a:lnRef idx="1">
-            <a:schemeClr val="dk1"/>
-          </a:lnRef>
-          <a:fillRef idx="0">
-            <a:schemeClr val="dk1"/>
-          </a:fillRef>
-          <a:effectRef idx="0">
-            <a:schemeClr val="dk1"/>
-          </a:effectRef>
-          <a:fontRef idx="minor">
-            <a:schemeClr val="tx1"/>
-          </a:fontRef>
-        </p:style>
-      </p:cxnSp>
-      <p:cxnSp>
-        <p:nvCxnSpPr>
-          <p:cNvPr id="27" name="Straight Connector 26"/>
-          <p:cNvCxnSpPr/>
-          <p:nvPr/>
-        </p:nvCxnSpPr>
-        <p:spPr>
-          <a:xfrm>
-            <a:off x="1341254" y="3210643"/>
-            <a:ext cx="956272" cy="0"/>
-          </a:xfrm>
-          <a:prstGeom prst="line">
-            <a:avLst/>
-          </a:prstGeom>
-        </p:spPr>
-        <p:style>
-          <a:lnRef idx="1">
-            <a:schemeClr val="dk1"/>
-          </a:lnRef>
-          <a:fillRef idx="0">
-            <a:schemeClr val="dk1"/>
-          </a:fillRef>
-          <a:effectRef idx="0">
-            <a:schemeClr val="dk1"/>
-          </a:effectRef>
-          <a:fontRef idx="minor">
-            <a:schemeClr val="tx1"/>
-          </a:fontRef>
-        </p:style>
-      </p:cxnSp>
-      <p:cxnSp>
-        <p:nvCxnSpPr>
-          <p:cNvPr id="29" name="Straight Connector 28"/>
-          <p:cNvCxnSpPr/>
-          <p:nvPr/>
-        </p:nvCxnSpPr>
-        <p:spPr>
-          <a:xfrm>
-            <a:off x="11017885" y="1273810"/>
-            <a:ext cx="0" cy="4216400"/>
-          </a:xfrm>
-          <a:prstGeom prst="line">
-            <a:avLst/>
-          </a:prstGeom>
-          <a:ln>
-            <a:solidFill>
-              <a:schemeClr val="tx1"/>
-            </a:solidFill>
-          </a:ln>
-        </p:spPr>
-        <p:style>
-          <a:lnRef idx="1">
-            <a:schemeClr val="accent1"/>
-          </a:lnRef>
-          <a:fillRef idx="0">
-            <a:schemeClr val="accent1"/>
-          </a:fillRef>
-          <a:effectRef idx="0">
-            <a:schemeClr val="accent1"/>
-          </a:effectRef>
-          <a:fontRef idx="minor">
-            <a:schemeClr val="tx1"/>
-          </a:fontRef>
-        </p:style>
-      </p:cxnSp>
-      <p:cxnSp>
-        <p:nvCxnSpPr>
-          <p:cNvPr id="30" name="Straight Connector 29"/>
-          <p:cNvCxnSpPr/>
-          <p:nvPr/>
-        </p:nvCxnSpPr>
-        <p:spPr>
-          <a:xfrm>
-            <a:off x="10934700" y="3232150"/>
-            <a:ext cx="0" cy="2247900"/>
-          </a:xfrm>
-          <a:prstGeom prst="line">
-            <a:avLst/>
-          </a:prstGeom>
-          <a:ln>
-            <a:solidFill>
-              <a:schemeClr val="tx1"/>
-            </a:solidFill>
-          </a:ln>
-        </p:spPr>
-        <p:style>
-          <a:lnRef idx="1">
-            <a:schemeClr val="accent1"/>
-          </a:lnRef>
-          <a:fillRef idx="0">
-            <a:schemeClr val="accent1"/>
-          </a:fillRef>
-          <a:effectRef idx="0">
-            <a:schemeClr val="accent1"/>
-          </a:effectRef>
-          <a:fontRef idx="minor">
-            <a:schemeClr val="tx1"/>
-          </a:fontRef>
-        </p:style>
-      </p:cxnSp>
-      <p:cxnSp>
-        <p:nvCxnSpPr>
-          <p:cNvPr id="31" name="Straight Connector 30"/>
-          <p:cNvCxnSpPr/>
-          <p:nvPr/>
-        </p:nvCxnSpPr>
-        <p:spPr>
-          <a:xfrm>
-            <a:off x="1371600" y="3194050"/>
-            <a:ext cx="0" cy="2247900"/>
-          </a:xfrm>
-          <a:prstGeom prst="line">
-            <a:avLst/>
-          </a:prstGeom>
-          <a:ln>
-            <a:solidFill>
-              <a:schemeClr val="tx1"/>
-            </a:solidFill>
-          </a:ln>
-        </p:spPr>
-        <p:style>
-          <a:lnRef idx="1">
-            <a:schemeClr val="accent1"/>
-          </a:lnRef>
-          <a:fillRef idx="0">
-            <a:schemeClr val="accent1"/>
-          </a:fillRef>
-          <a:effectRef idx="0">
-            <a:schemeClr val="accent1"/>
-          </a:effectRef>
-          <a:fontRef idx="minor">
-            <a:schemeClr val="tx1"/>
-          </a:fontRef>
-        </p:style>
-      </p:cxnSp>
-      <p:cxnSp>
-        <p:nvCxnSpPr>
-          <p:cNvPr id="32" name="Straight Connector 31"/>
-          <p:cNvCxnSpPr/>
-          <p:nvPr/>
-        </p:nvCxnSpPr>
-        <p:spPr>
-          <a:xfrm>
-            <a:off x="1289685" y="1254760"/>
-            <a:ext cx="0" cy="4212590"/>
-          </a:xfrm>
-          <a:prstGeom prst="line">
-            <a:avLst/>
-          </a:prstGeom>
-          <a:ln>
-            <a:solidFill>
-              <a:schemeClr val="tx1"/>
-            </a:solidFill>
-          </a:ln>
-        </p:spPr>
-        <p:style>
-          <a:lnRef idx="1">
-            <a:schemeClr val="accent1"/>
-          </a:lnRef>
-          <a:fillRef idx="0">
-            <a:schemeClr val="accent1"/>
-          </a:fillRef>
-          <a:effectRef idx="0">
-            <a:schemeClr val="accent1"/>
           </a:effectRef>
           <a:fontRef idx="minor">
             <a:schemeClr val="tx1"/>

</xml_diff>